<commit_message>
New flyer for class
</commit_message>
<xml_diff>
--- a/docs/Advanced Biological Control Systems - Figures.pptx
+++ b/docs/Advanced Biological Control Systems - Figures.pptx
@@ -106,6 +106,11 @@
       </a:defRPr>
     </a:lvl9pPr>
   </p:defaultTextStyle>
+  <p:extLst>
+    <p:ext uri="{EFAFB233-063F-42B5-8137-9DF3F51BA10A}">
+      <p15:sldGuideLst xmlns:p15="http://schemas.microsoft.com/office/powerpoint/2012/main"/>
+    </p:ext>
+  </p:extLst>
 </p:presentation>
 </file>
 
@@ -256,7 +261,7 @@
           <a:p>
             <a:fld id="{7C2E31FC-62A1-354D-9EAE-1878143CD131}" type="datetimeFigureOut">
               <a:rPr lang="en-US" smtClean="0"/>
-              <a:t>2/14/22</a:t>
+              <a:t>10/30/23</a:t>
             </a:fld>
             <a:endParaRPr lang="en-US"/>
           </a:p>
@@ -454,7 +459,7 @@
           <a:p>
             <a:fld id="{7C2E31FC-62A1-354D-9EAE-1878143CD131}" type="datetimeFigureOut">
               <a:rPr lang="en-US" smtClean="0"/>
-              <a:t>2/14/22</a:t>
+              <a:t>10/30/23</a:t>
             </a:fld>
             <a:endParaRPr lang="en-US"/>
           </a:p>
@@ -662,7 +667,7 @@
           <a:p>
             <a:fld id="{7C2E31FC-62A1-354D-9EAE-1878143CD131}" type="datetimeFigureOut">
               <a:rPr lang="en-US" smtClean="0"/>
-              <a:t>2/14/22</a:t>
+              <a:t>10/30/23</a:t>
             </a:fld>
             <a:endParaRPr lang="en-US"/>
           </a:p>
@@ -860,7 +865,7 @@
           <a:p>
             <a:fld id="{7C2E31FC-62A1-354D-9EAE-1878143CD131}" type="datetimeFigureOut">
               <a:rPr lang="en-US" smtClean="0"/>
-              <a:t>2/14/22</a:t>
+              <a:t>10/30/23</a:t>
             </a:fld>
             <a:endParaRPr lang="en-US"/>
           </a:p>
@@ -1135,7 +1140,7 @@
           <a:p>
             <a:fld id="{7C2E31FC-62A1-354D-9EAE-1878143CD131}" type="datetimeFigureOut">
               <a:rPr lang="en-US" smtClean="0"/>
-              <a:t>2/14/22</a:t>
+              <a:t>10/30/23</a:t>
             </a:fld>
             <a:endParaRPr lang="en-US"/>
           </a:p>
@@ -1400,7 +1405,7 @@
           <a:p>
             <a:fld id="{7C2E31FC-62A1-354D-9EAE-1878143CD131}" type="datetimeFigureOut">
               <a:rPr lang="en-US" smtClean="0"/>
-              <a:t>2/14/22</a:t>
+              <a:t>10/30/23</a:t>
             </a:fld>
             <a:endParaRPr lang="en-US"/>
           </a:p>
@@ -1812,7 +1817,7 @@
           <a:p>
             <a:fld id="{7C2E31FC-62A1-354D-9EAE-1878143CD131}" type="datetimeFigureOut">
               <a:rPr lang="en-US" smtClean="0"/>
-              <a:t>2/14/22</a:t>
+              <a:t>10/30/23</a:t>
             </a:fld>
             <a:endParaRPr lang="en-US"/>
           </a:p>
@@ -1953,7 +1958,7 @@
           <a:p>
             <a:fld id="{7C2E31FC-62A1-354D-9EAE-1878143CD131}" type="datetimeFigureOut">
               <a:rPr lang="en-US" smtClean="0"/>
-              <a:t>2/14/22</a:t>
+              <a:t>10/30/23</a:t>
             </a:fld>
             <a:endParaRPr lang="en-US"/>
           </a:p>
@@ -2066,7 +2071,7 @@
           <a:p>
             <a:fld id="{7C2E31FC-62A1-354D-9EAE-1878143CD131}" type="datetimeFigureOut">
               <a:rPr lang="en-US" smtClean="0"/>
-              <a:t>2/14/22</a:t>
+              <a:t>10/30/23</a:t>
             </a:fld>
             <a:endParaRPr lang="en-US"/>
           </a:p>
@@ -2377,7 +2382,7 @@
           <a:p>
             <a:fld id="{7C2E31FC-62A1-354D-9EAE-1878143CD131}" type="datetimeFigureOut">
               <a:rPr lang="en-US" smtClean="0"/>
-              <a:t>2/14/22</a:t>
+              <a:t>10/30/23</a:t>
             </a:fld>
             <a:endParaRPr lang="en-US"/>
           </a:p>
@@ -2665,7 +2670,7 @@
           <a:p>
             <a:fld id="{7C2E31FC-62A1-354D-9EAE-1878143CD131}" type="datetimeFigureOut">
               <a:rPr lang="en-US" smtClean="0"/>
-              <a:t>2/14/22</a:t>
+              <a:t>10/30/23</a:t>
             </a:fld>
             <a:endParaRPr lang="en-US"/>
           </a:p>
@@ -2906,7 +2911,7 @@
           <a:p>
             <a:fld id="{7C2E31FC-62A1-354D-9EAE-1878143CD131}" type="datetimeFigureOut">
               <a:rPr lang="en-US" smtClean="0"/>
-              <a:t>2/14/22</a:t>
+              <a:t>10/30/23</a:t>
             </a:fld>
             <a:endParaRPr lang="en-US"/>
           </a:p>
@@ -3820,7 +3825,7 @@
         <p:spPr>
           <a:xfrm>
             <a:off x="1832362" y="3834437"/>
-            <a:ext cx="8447435" cy="2246769"/>
+            <a:ext cx="8447435" cy="2031325"/>
           </a:xfrm>
           <a:prstGeom prst="rect">
             <a:avLst/>
@@ -3835,7 +3840,7 @@
           <a:p>
             <a:r>
               <a:rPr lang="en-US" sz="1400" dirty="0"/>
-              <a:t>This course teaches students how to design systems that control chemical networks with applications to bioreactors, medical devices, and the analysis of biochemical networks.  The course addresses controllability and observability of chemical networks, construction of state space feedback controllers, state observers, noise attenuation and disturbance rejection, and some elements of system identification. Some learning objectives are:</a:t>
+              <a:t>Engineers have long used feedback to control unreliable devices and regulate complex processes. Applications in biology include bioreactors, medical devices, and the analysis of biochemical networks This course teaches the basics of control engineering to bioengineers and allied disciplines. Some learning objectives are:</a:t>
             </a:r>
           </a:p>
           <a:p>
@@ -3845,7 +3850,7 @@
             </a:pPr>
             <a:r>
               <a:rPr lang="en-US" sz="1400" dirty="0"/>
-              <a:t>construct and analyze models of chemical networks in both continuous and discrete time;</a:t>
+              <a:t>learn common controller and control system designs;</a:t>
             </a:r>
           </a:p>
           <a:p>
@@ -3855,7 +3860,7 @@
             </a:pPr>
             <a:r>
               <a:rPr lang="en-US" sz="1400" dirty="0"/>
-              <a:t>analyze the controllability of chemical networks, and isolate controllable subparts of uncontrollable networks;</a:t>
+              <a:t>analyze the controllability of biochemical networks, the extent to which there are inputs such as temperature or pH that control outputs such as metabolite concentrations;</a:t>
             </a:r>
           </a:p>
           <a:p>
@@ -3865,7 +3870,7 @@
             </a:pPr>
             <a:r>
               <a:rPr lang="en-US" sz="1400" dirty="0"/>
-              <a:t>analyze the observability of chemical networks, and isolate observable subparts of unobservable networks;</a:t>
+              <a:t>apply linear system theory to predict behaviors such as stability, settling times, and overshoot; and</a:t>
             </a:r>
           </a:p>
           <a:p>
@@ -3875,27 +3880,13 @@
             </a:pPr>
             <a:r>
               <a:rPr lang="en-US" sz="1400" dirty="0"/>
-              <a:t>control a chemical network using full state feedback;</a:t>
-            </a:r>
-          </a:p>
-          <a:p>
-            <a:pPr marL="171450" indent="-171450" fontAlgn="base">
-              <a:buFont typeface="Arial" panose="020B0604020202020204" pitchFamily="34" charset="0"/>
-              <a:buChar char="•"/>
-            </a:pPr>
+              <a:t>develop skills with control system design.</a:t>
+            </a:r>
+          </a:p>
+          <a:p>
             <a:r>
               <a:rPr lang="en-US" sz="1400" dirty="0"/>
-              <a:t>implement robust control to address model inaccuracies and measurement noise.</a:t>
-            </a:r>
-          </a:p>
-          <a:p>
-            <a:r>
-              <a:rPr lang="en-US" sz="1400" dirty="0" err="1"/>
-              <a:t>Prereq</a:t>
-            </a:r>
-            <a:r>
-              <a:rPr lang="en-US" sz="1400" dirty="0"/>
-              <a:t>: BIOEN 336 (Bioengineering systems &amp; control) or equivalent.</a:t>
+              <a:t>Ideally students have taken BIOEN 336 (Bioengineering systems &amp; control) or equivalent.</a:t>
             </a:r>
           </a:p>
         </p:txBody>
@@ -4075,7 +4066,7 @@
                 </a:solidFill>
                 <a:latin typeface="Arial" panose="020B0604020202020204" pitchFamily="34" charset="0"/>
               </a:rPr>
-              <a:t>Spring, 2022. MW 1:30 – 2:20, Friday 12:30 – 2:20.</a:t>
+              <a:t>Winter, 2024. MW 1:00 – 2:20.</a:t>
             </a:r>
           </a:p>
           <a:p>

</xml_diff>